<commit_message>
S2S forecast from 2023-05-18
</commit_message>
<xml_diff>
--- a/doc/img/Example.pptx
+++ b/doc/img/Example.pptx
@@ -104,6 +104,11 @@
       </a:defRPr>
     </a:lvl9pPr>
   </p:defaultTextStyle>
+  <p:extLst>
+    <p:ext uri="{EFAFB233-063F-42B5-8137-9DF3F51BA10A}">
+      <p15:sldGuideLst xmlns:p15="http://schemas.microsoft.com/office/powerpoint/2012/main"/>
+    </p:ext>
+  </p:extLst>
 </p:presentation>
 </file>
 
@@ -256,7 +261,7 @@
           <a:p>
             <a:fld id="{9004AD4B-8966-4441-9014-803FEF7105C4}" type="datetimeFigureOut">
               <a:rPr lang="en-GB" smtClean="0"/>
-              <a:t>08/05/2023</a:t>
+              <a:t>16/05/2023</a:t>
             </a:fld>
             <a:endParaRPr lang="en-GB"/>
           </a:p>
@@ -456,7 +461,7 @@
           <a:p>
             <a:fld id="{9004AD4B-8966-4441-9014-803FEF7105C4}" type="datetimeFigureOut">
               <a:rPr lang="en-GB" smtClean="0"/>
-              <a:t>08/05/2023</a:t>
+              <a:t>16/05/2023</a:t>
             </a:fld>
             <a:endParaRPr lang="en-GB"/>
           </a:p>
@@ -666,7 +671,7 @@
           <a:p>
             <a:fld id="{9004AD4B-8966-4441-9014-803FEF7105C4}" type="datetimeFigureOut">
               <a:rPr lang="en-GB" smtClean="0"/>
-              <a:t>08/05/2023</a:t>
+              <a:t>16/05/2023</a:t>
             </a:fld>
             <a:endParaRPr lang="en-GB"/>
           </a:p>
@@ -866,7 +871,7 @@
           <a:p>
             <a:fld id="{9004AD4B-8966-4441-9014-803FEF7105C4}" type="datetimeFigureOut">
               <a:rPr lang="en-GB" smtClean="0"/>
-              <a:t>08/05/2023</a:t>
+              <a:t>16/05/2023</a:t>
             </a:fld>
             <a:endParaRPr lang="en-GB"/>
           </a:p>
@@ -1142,7 +1147,7 @@
           <a:p>
             <a:fld id="{9004AD4B-8966-4441-9014-803FEF7105C4}" type="datetimeFigureOut">
               <a:rPr lang="en-GB" smtClean="0"/>
-              <a:t>08/05/2023</a:t>
+              <a:t>16/05/2023</a:t>
             </a:fld>
             <a:endParaRPr lang="en-GB"/>
           </a:p>
@@ -1410,7 +1415,7 @@
           <a:p>
             <a:fld id="{9004AD4B-8966-4441-9014-803FEF7105C4}" type="datetimeFigureOut">
               <a:rPr lang="en-GB" smtClean="0"/>
-              <a:t>08/05/2023</a:t>
+              <a:t>16/05/2023</a:t>
             </a:fld>
             <a:endParaRPr lang="en-GB"/>
           </a:p>
@@ -1825,7 +1830,7 @@
           <a:p>
             <a:fld id="{9004AD4B-8966-4441-9014-803FEF7105C4}" type="datetimeFigureOut">
               <a:rPr lang="en-GB" smtClean="0"/>
-              <a:t>08/05/2023</a:t>
+              <a:t>16/05/2023</a:t>
             </a:fld>
             <a:endParaRPr lang="en-GB"/>
           </a:p>
@@ -1967,7 +1972,7 @@
           <a:p>
             <a:fld id="{9004AD4B-8966-4441-9014-803FEF7105C4}" type="datetimeFigureOut">
               <a:rPr lang="en-GB" smtClean="0"/>
-              <a:t>08/05/2023</a:t>
+              <a:t>16/05/2023</a:t>
             </a:fld>
             <a:endParaRPr lang="en-GB"/>
           </a:p>
@@ -2080,7 +2085,7 @@
           <a:p>
             <a:fld id="{9004AD4B-8966-4441-9014-803FEF7105C4}" type="datetimeFigureOut">
               <a:rPr lang="en-GB" smtClean="0"/>
-              <a:t>08/05/2023</a:t>
+              <a:t>16/05/2023</a:t>
             </a:fld>
             <a:endParaRPr lang="en-GB"/>
           </a:p>
@@ -2393,7 +2398,7 @@
           <a:p>
             <a:fld id="{9004AD4B-8966-4441-9014-803FEF7105C4}" type="datetimeFigureOut">
               <a:rPr lang="en-GB" smtClean="0"/>
-              <a:t>08/05/2023</a:t>
+              <a:t>16/05/2023</a:t>
             </a:fld>
             <a:endParaRPr lang="en-GB"/>
           </a:p>
@@ -2682,7 +2687,7 @@
           <a:p>
             <a:fld id="{9004AD4B-8966-4441-9014-803FEF7105C4}" type="datetimeFigureOut">
               <a:rPr lang="en-GB" smtClean="0"/>
-              <a:t>08/05/2023</a:t>
+              <a:t>16/05/2023</a:t>
             </a:fld>
             <a:endParaRPr lang="en-GB"/>
           </a:p>
@@ -2925,7 +2930,7 @@
           <a:p>
             <a:fld id="{9004AD4B-8966-4441-9014-803FEF7105C4}" type="datetimeFigureOut">
               <a:rPr lang="en-GB" smtClean="0"/>
-              <a:t>08/05/2023</a:t>
+              <a:t>16/05/2023</a:t>
             </a:fld>
             <a:endParaRPr lang="en-GB"/>
           </a:p>
@@ -3444,8 +3449,8 @@
           </p:nvSpPr>
           <p:spPr>
             <a:xfrm>
-              <a:off x="6679734" y="4715159"/>
-              <a:ext cx="645952" cy="307777"/>
+              <a:off x="6394507" y="4757104"/>
+              <a:ext cx="1044503" cy="307777"/>
             </a:xfrm>
             <a:prstGeom prst="rect">
               <a:avLst/>
@@ -3463,7 +3468,7 @@
                 <a:rPr lang="en-GB" sz="1400" i="1" dirty="0">
                   <a:latin typeface="Abadi" panose="020B0604020104020204" pitchFamily="34" charset="0"/>
                 </a:rPr>
-                <a:t>Q1</a:t>
+                <a:t>25 Perc.</a:t>
               </a:r>
             </a:p>
           </p:txBody>
@@ -3482,8 +3487,8 @@
           </p:nvSpPr>
           <p:spPr>
             <a:xfrm>
-              <a:off x="6679734" y="3877579"/>
-              <a:ext cx="645952" cy="338554"/>
+              <a:off x="6545509" y="3877579"/>
+              <a:ext cx="1044504" cy="307777"/>
             </a:xfrm>
             <a:prstGeom prst="rect">
               <a:avLst/>
@@ -3498,10 +3503,10 @@
             <a:p>
               <a:pPr algn="ctr"/>
               <a:r>
-                <a:rPr lang="en-GB" sz="1600" i="1" dirty="0">
+                <a:rPr lang="en-GB" sz="1400" i="1" dirty="0">
                   <a:latin typeface="Abadi" panose="020B0604020104020204" pitchFamily="34" charset="0"/>
                 </a:rPr>
-                <a:t>Q3</a:t>
+                <a:t>75 Perc.</a:t>
               </a:r>
             </a:p>
           </p:txBody>
@@ -3701,6 +3706,217 @@
           </p:txBody>
         </p:sp>
       </p:grpSp>
+      <p:sp>
+        <p:nvSpPr>
+          <p:cNvPr id="2" name="TextBox 1">
+            <a:extLst>
+              <a:ext uri="{FF2B5EF4-FFF2-40B4-BE49-F238E27FC236}">
+                <a16:creationId xmlns:a16="http://schemas.microsoft.com/office/drawing/2014/main" id="{DD479588-5E62-EF56-7DAE-91D8F700BFC1}"/>
+              </a:ext>
+            </a:extLst>
+          </p:cNvPr>
+          <p:cNvSpPr txBox="1"/>
+          <p:nvPr/>
+        </p:nvSpPr>
+        <p:spPr>
+          <a:xfrm>
+            <a:off x="3014039" y="5484740"/>
+            <a:ext cx="494950" cy="369332"/>
+          </a:xfrm>
+          <a:prstGeom prst="rect">
+            <a:avLst/>
+          </a:prstGeom>
+          <a:noFill/>
+        </p:spPr>
+        <p:txBody>
+          <a:bodyPr wrap="square" rtlCol="0">
+            <a:spAutoFit/>
+          </a:bodyPr>
+          <a:lstStyle/>
+          <a:p>
+            <a:r>
+              <a:rPr lang="en-GB" dirty="0"/>
+              <a:t>10</a:t>
+            </a:r>
+          </a:p>
+        </p:txBody>
+      </p:sp>
+      <p:sp>
+        <p:nvSpPr>
+          <p:cNvPr id="3" name="TextBox 2">
+            <a:extLst>
+              <a:ext uri="{FF2B5EF4-FFF2-40B4-BE49-F238E27FC236}">
+                <a16:creationId xmlns:a16="http://schemas.microsoft.com/office/drawing/2014/main" id="{1A62328C-23BF-D754-102E-250012E081CD}"/>
+              </a:ext>
+            </a:extLst>
+          </p:cNvPr>
+          <p:cNvSpPr txBox="1"/>
+          <p:nvPr/>
+        </p:nvSpPr>
+        <p:spPr>
+          <a:xfrm>
+            <a:off x="4986850" y="5483809"/>
+            <a:ext cx="494950" cy="369332"/>
+          </a:xfrm>
+          <a:prstGeom prst="rect">
+            <a:avLst/>
+          </a:prstGeom>
+          <a:noFill/>
+        </p:spPr>
+        <p:txBody>
+          <a:bodyPr wrap="square" rtlCol="0">
+            <a:spAutoFit/>
+          </a:bodyPr>
+          <a:lstStyle/>
+          <a:p>
+            <a:r>
+              <a:rPr lang="en-GB" dirty="0"/>
+              <a:t>20</a:t>
+            </a:r>
+          </a:p>
+        </p:txBody>
+      </p:sp>
+      <p:sp>
+        <p:nvSpPr>
+          <p:cNvPr id="4" name="TextBox 3">
+            <a:extLst>
+              <a:ext uri="{FF2B5EF4-FFF2-40B4-BE49-F238E27FC236}">
+                <a16:creationId xmlns:a16="http://schemas.microsoft.com/office/drawing/2014/main" id="{0100443F-3887-CE12-24CE-344C826AB266}"/>
+              </a:ext>
+            </a:extLst>
+          </p:cNvPr>
+          <p:cNvSpPr txBox="1"/>
+          <p:nvPr/>
+        </p:nvSpPr>
+        <p:spPr>
+          <a:xfrm>
+            <a:off x="6838141" y="5483809"/>
+            <a:ext cx="494950" cy="369332"/>
+          </a:xfrm>
+          <a:prstGeom prst="rect">
+            <a:avLst/>
+          </a:prstGeom>
+          <a:noFill/>
+        </p:spPr>
+        <p:txBody>
+          <a:bodyPr wrap="square" rtlCol="0">
+            <a:spAutoFit/>
+          </a:bodyPr>
+          <a:lstStyle/>
+          <a:p>
+            <a:r>
+              <a:rPr lang="en-GB" dirty="0"/>
+              <a:t>30</a:t>
+            </a:r>
+          </a:p>
+        </p:txBody>
+      </p:sp>
+      <p:sp>
+        <p:nvSpPr>
+          <p:cNvPr id="6" name="TextBox 5">
+            <a:extLst>
+              <a:ext uri="{FF2B5EF4-FFF2-40B4-BE49-F238E27FC236}">
+                <a16:creationId xmlns:a16="http://schemas.microsoft.com/office/drawing/2014/main" id="{3CE9C810-17C9-2B34-8EA9-06896DC79794}"/>
+              </a:ext>
+            </a:extLst>
+          </p:cNvPr>
+          <p:cNvSpPr txBox="1"/>
+          <p:nvPr/>
+        </p:nvSpPr>
+        <p:spPr>
+          <a:xfrm>
+            <a:off x="8683011" y="5483809"/>
+            <a:ext cx="494950" cy="369332"/>
+          </a:xfrm>
+          <a:prstGeom prst="rect">
+            <a:avLst/>
+          </a:prstGeom>
+          <a:noFill/>
+        </p:spPr>
+        <p:txBody>
+          <a:bodyPr wrap="square" rtlCol="0">
+            <a:spAutoFit/>
+          </a:bodyPr>
+          <a:lstStyle/>
+          <a:p>
+            <a:r>
+              <a:rPr lang="en-GB" dirty="0"/>
+              <a:t>40</a:t>
+            </a:r>
+          </a:p>
+        </p:txBody>
+      </p:sp>
+      <p:sp>
+        <p:nvSpPr>
+          <p:cNvPr id="7" name="TextBox 6">
+            <a:extLst>
+              <a:ext uri="{FF2B5EF4-FFF2-40B4-BE49-F238E27FC236}">
+                <a16:creationId xmlns:a16="http://schemas.microsoft.com/office/drawing/2014/main" id="{AE5624F2-BC40-AFC6-0FAE-14FEFC6202B6}"/>
+              </a:ext>
+            </a:extLst>
+          </p:cNvPr>
+          <p:cNvSpPr txBox="1"/>
+          <p:nvPr/>
+        </p:nvSpPr>
+        <p:spPr>
+          <a:xfrm>
+            <a:off x="10615863" y="5483809"/>
+            <a:ext cx="494950" cy="369332"/>
+          </a:xfrm>
+          <a:prstGeom prst="rect">
+            <a:avLst/>
+          </a:prstGeom>
+          <a:noFill/>
+        </p:spPr>
+        <p:txBody>
+          <a:bodyPr wrap="square" rtlCol="0">
+            <a:spAutoFit/>
+          </a:bodyPr>
+          <a:lstStyle/>
+          <a:p>
+            <a:r>
+              <a:rPr lang="en-GB" dirty="0"/>
+              <a:t>50</a:t>
+            </a:r>
+          </a:p>
+        </p:txBody>
+      </p:sp>
+      <p:sp>
+        <p:nvSpPr>
+          <p:cNvPr id="16" name="TextBox 15">
+            <a:extLst>
+              <a:ext uri="{FF2B5EF4-FFF2-40B4-BE49-F238E27FC236}">
+                <a16:creationId xmlns:a16="http://schemas.microsoft.com/office/drawing/2014/main" id="{B98A2C33-0C14-49CC-F40A-C60A46078EF5}"/>
+              </a:ext>
+            </a:extLst>
+          </p:cNvPr>
+          <p:cNvSpPr txBox="1"/>
+          <p:nvPr/>
+        </p:nvSpPr>
+        <p:spPr>
+          <a:xfrm>
+            <a:off x="5081427" y="5807379"/>
+            <a:ext cx="2626160" cy="369332"/>
+          </a:xfrm>
+          <a:prstGeom prst="rect">
+            <a:avLst/>
+          </a:prstGeom>
+          <a:noFill/>
+        </p:spPr>
+        <p:txBody>
+          <a:bodyPr wrap="square" rtlCol="0">
+            <a:spAutoFit/>
+          </a:bodyPr>
+          <a:lstStyle/>
+          <a:p>
+            <a:pPr algn="ctr"/>
+            <a:r>
+              <a:rPr lang="en-GB" dirty="0"/>
+              <a:t>Week in the year</a:t>
+            </a:r>
+          </a:p>
+        </p:txBody>
+      </p:sp>
     </p:spTree>
     <p:extLst>
       <p:ext uri="{BB962C8B-B14F-4D97-AF65-F5344CB8AC3E}">

</xml_diff>

<commit_message>
S2S forecast from 2023-08-25
</commit_message>
<xml_diff>
--- a/doc/img/Example.pptx
+++ b/doc/img/Example.pptx
@@ -6,6 +6,7 @@
   </p:sldMasterIdLst>
   <p:sldIdLst>
     <p:sldId id="256" r:id="rId2"/>
+    <p:sldId id="257" r:id="rId3"/>
   </p:sldIdLst>
   <p:sldSz cx="12192000" cy="6858000"/>
   <p:notesSz cx="6858000" cy="9144000"/>
@@ -261,7 +262,7 @@
           <a:p>
             <a:fld id="{9004AD4B-8966-4441-9014-803FEF7105C4}" type="datetimeFigureOut">
               <a:rPr lang="en-GB" smtClean="0"/>
-              <a:t>16/05/2023</a:t>
+              <a:t>28/08/2023</a:t>
             </a:fld>
             <a:endParaRPr lang="en-GB"/>
           </a:p>
@@ -461,7 +462,7 @@
           <a:p>
             <a:fld id="{9004AD4B-8966-4441-9014-803FEF7105C4}" type="datetimeFigureOut">
               <a:rPr lang="en-GB" smtClean="0"/>
-              <a:t>16/05/2023</a:t>
+              <a:t>28/08/2023</a:t>
             </a:fld>
             <a:endParaRPr lang="en-GB"/>
           </a:p>
@@ -671,7 +672,7 @@
           <a:p>
             <a:fld id="{9004AD4B-8966-4441-9014-803FEF7105C4}" type="datetimeFigureOut">
               <a:rPr lang="en-GB" smtClean="0"/>
-              <a:t>16/05/2023</a:t>
+              <a:t>28/08/2023</a:t>
             </a:fld>
             <a:endParaRPr lang="en-GB"/>
           </a:p>
@@ -871,7 +872,7 @@
           <a:p>
             <a:fld id="{9004AD4B-8966-4441-9014-803FEF7105C4}" type="datetimeFigureOut">
               <a:rPr lang="en-GB" smtClean="0"/>
-              <a:t>16/05/2023</a:t>
+              <a:t>28/08/2023</a:t>
             </a:fld>
             <a:endParaRPr lang="en-GB"/>
           </a:p>
@@ -1147,7 +1148,7 @@
           <a:p>
             <a:fld id="{9004AD4B-8966-4441-9014-803FEF7105C4}" type="datetimeFigureOut">
               <a:rPr lang="en-GB" smtClean="0"/>
-              <a:t>16/05/2023</a:t>
+              <a:t>28/08/2023</a:t>
             </a:fld>
             <a:endParaRPr lang="en-GB"/>
           </a:p>
@@ -1415,7 +1416,7 @@
           <a:p>
             <a:fld id="{9004AD4B-8966-4441-9014-803FEF7105C4}" type="datetimeFigureOut">
               <a:rPr lang="en-GB" smtClean="0"/>
-              <a:t>16/05/2023</a:t>
+              <a:t>28/08/2023</a:t>
             </a:fld>
             <a:endParaRPr lang="en-GB"/>
           </a:p>
@@ -1830,7 +1831,7 @@
           <a:p>
             <a:fld id="{9004AD4B-8966-4441-9014-803FEF7105C4}" type="datetimeFigureOut">
               <a:rPr lang="en-GB" smtClean="0"/>
-              <a:t>16/05/2023</a:t>
+              <a:t>28/08/2023</a:t>
             </a:fld>
             <a:endParaRPr lang="en-GB"/>
           </a:p>
@@ -1972,7 +1973,7 @@
           <a:p>
             <a:fld id="{9004AD4B-8966-4441-9014-803FEF7105C4}" type="datetimeFigureOut">
               <a:rPr lang="en-GB" smtClean="0"/>
-              <a:t>16/05/2023</a:t>
+              <a:t>28/08/2023</a:t>
             </a:fld>
             <a:endParaRPr lang="en-GB"/>
           </a:p>
@@ -2085,7 +2086,7 @@
           <a:p>
             <a:fld id="{9004AD4B-8966-4441-9014-803FEF7105C4}" type="datetimeFigureOut">
               <a:rPr lang="en-GB" smtClean="0"/>
-              <a:t>16/05/2023</a:t>
+              <a:t>28/08/2023</a:t>
             </a:fld>
             <a:endParaRPr lang="en-GB"/>
           </a:p>
@@ -2398,7 +2399,7 @@
           <a:p>
             <a:fld id="{9004AD4B-8966-4441-9014-803FEF7105C4}" type="datetimeFigureOut">
               <a:rPr lang="en-GB" smtClean="0"/>
-              <a:t>16/05/2023</a:t>
+              <a:t>28/08/2023</a:t>
             </a:fld>
             <a:endParaRPr lang="en-GB"/>
           </a:p>
@@ -2687,7 +2688,7 @@
           <a:p>
             <a:fld id="{9004AD4B-8966-4441-9014-803FEF7105C4}" type="datetimeFigureOut">
               <a:rPr lang="en-GB" smtClean="0"/>
-              <a:t>16/05/2023</a:t>
+              <a:t>28/08/2023</a:t>
             </a:fld>
             <a:endParaRPr lang="en-GB"/>
           </a:p>
@@ -2930,7 +2931,7 @@
           <a:p>
             <a:fld id="{9004AD4B-8966-4441-9014-803FEF7105C4}" type="datetimeFigureOut">
               <a:rPr lang="en-GB" smtClean="0"/>
-              <a:t>16/05/2023</a:t>
+              <a:t>28/08/2023</a:t>
             </a:fld>
             <a:endParaRPr lang="en-GB"/>
           </a:p>
@@ -3347,12 +3348,591 @@
           <a:chExt cx="0" cy="0"/>
         </a:xfrm>
       </p:grpSpPr>
+      <p:pic>
+        <p:nvPicPr>
+          <p:cNvPr id="5" name="Picture 4" descr="Median">
+            <a:extLst>
+              <a:ext uri="{FF2B5EF4-FFF2-40B4-BE49-F238E27FC236}">
+                <a16:creationId xmlns:a16="http://schemas.microsoft.com/office/drawing/2014/main" id="{CFF44B28-DDB9-F2DB-33C0-6BA156E3B4CC}"/>
+              </a:ext>
+            </a:extLst>
+          </p:cNvPr>
+          <p:cNvPicPr>
+            <a:picLocks noChangeAspect="1"/>
+          </p:cNvPicPr>
+          <p:nvPr/>
+        </p:nvPicPr>
+        <p:blipFill>
+          <a:blip r:embed="rId2"/>
+          <a:stretch>
+            <a:fillRect/>
+          </a:stretch>
+        </p:blipFill>
+        <p:spPr>
+          <a:xfrm>
+            <a:off x="527860" y="1004549"/>
+            <a:ext cx="11136279" cy="4848902"/>
+          </a:xfrm>
+          <a:prstGeom prst="rect">
+            <a:avLst/>
+          </a:prstGeom>
+        </p:spPr>
+      </p:pic>
+      <p:sp>
+        <p:nvSpPr>
+          <p:cNvPr id="8" name="TextBox 7">
+            <a:extLst>
+              <a:ext uri="{FF2B5EF4-FFF2-40B4-BE49-F238E27FC236}">
+                <a16:creationId xmlns:a16="http://schemas.microsoft.com/office/drawing/2014/main" id="{E33A3626-B1EF-06CA-5BF1-B01881D29987}"/>
+              </a:ext>
+            </a:extLst>
+          </p:cNvPr>
+          <p:cNvSpPr txBox="1"/>
+          <p:nvPr/>
+        </p:nvSpPr>
+        <p:spPr>
+          <a:xfrm>
+            <a:off x="6582562" y="4457257"/>
+            <a:ext cx="840297" cy="307777"/>
+          </a:xfrm>
+          <a:prstGeom prst="rect">
+            <a:avLst/>
+          </a:prstGeom>
+          <a:noFill/>
+        </p:spPr>
+        <p:txBody>
+          <a:bodyPr wrap="square" rtlCol="0">
+            <a:spAutoFit/>
+          </a:bodyPr>
+          <a:lstStyle/>
+          <a:p>
+            <a:pPr algn="ctr"/>
+            <a:r>
+              <a:rPr lang="en-GB" sz="1400" i="1" dirty="0">
+                <a:latin typeface="Abadi" panose="020B0604020104020204" pitchFamily="34" charset="0"/>
+              </a:rPr>
+              <a:t>Median</a:t>
+            </a:r>
+          </a:p>
+        </p:txBody>
+      </p:sp>
+      <p:sp>
+        <p:nvSpPr>
+          <p:cNvPr id="9" name="TextBox 8">
+            <a:extLst>
+              <a:ext uri="{FF2B5EF4-FFF2-40B4-BE49-F238E27FC236}">
+                <a16:creationId xmlns:a16="http://schemas.microsoft.com/office/drawing/2014/main" id="{BB1B7C81-B949-F830-3322-35522635582C}"/>
+              </a:ext>
+            </a:extLst>
+          </p:cNvPr>
+          <p:cNvSpPr txBox="1"/>
+          <p:nvPr/>
+        </p:nvSpPr>
+        <p:spPr>
+          <a:xfrm>
+            <a:off x="6394507" y="4757104"/>
+            <a:ext cx="1044503" cy="307777"/>
+          </a:xfrm>
+          <a:prstGeom prst="rect">
+            <a:avLst/>
+          </a:prstGeom>
+          <a:noFill/>
+        </p:spPr>
+        <p:txBody>
+          <a:bodyPr wrap="square" rtlCol="0">
+            <a:spAutoFit/>
+          </a:bodyPr>
+          <a:lstStyle/>
+          <a:p>
+            <a:pPr algn="ctr"/>
+            <a:r>
+              <a:rPr lang="en-GB" sz="1400" i="1" dirty="0">
+                <a:latin typeface="Abadi" panose="020B0604020104020204" pitchFamily="34" charset="0"/>
+              </a:rPr>
+              <a:t>25 Perc.</a:t>
+            </a:r>
+          </a:p>
+        </p:txBody>
+      </p:sp>
+      <p:sp>
+        <p:nvSpPr>
+          <p:cNvPr id="10" name="TextBox 9">
+            <a:extLst>
+              <a:ext uri="{FF2B5EF4-FFF2-40B4-BE49-F238E27FC236}">
+                <a16:creationId xmlns:a16="http://schemas.microsoft.com/office/drawing/2014/main" id="{8214ECED-0396-6886-7B3F-E4BDC9AA7610}"/>
+              </a:ext>
+            </a:extLst>
+          </p:cNvPr>
+          <p:cNvSpPr txBox="1"/>
+          <p:nvPr/>
+        </p:nvSpPr>
+        <p:spPr>
+          <a:xfrm>
+            <a:off x="6545509" y="3877579"/>
+            <a:ext cx="1044504" cy="307777"/>
+          </a:xfrm>
+          <a:prstGeom prst="rect">
+            <a:avLst/>
+          </a:prstGeom>
+          <a:noFill/>
+        </p:spPr>
+        <p:txBody>
+          <a:bodyPr wrap="square" rtlCol="0">
+            <a:spAutoFit/>
+          </a:bodyPr>
+          <a:lstStyle/>
+          <a:p>
+            <a:pPr algn="ctr"/>
+            <a:r>
+              <a:rPr lang="en-GB" sz="1400" i="1" dirty="0">
+                <a:latin typeface="Abadi" panose="020B0604020104020204" pitchFamily="34" charset="0"/>
+              </a:rPr>
+              <a:t>75 Perc.</a:t>
+            </a:r>
+          </a:p>
+        </p:txBody>
+      </p:sp>
+      <p:sp>
+        <p:nvSpPr>
+          <p:cNvPr id="11" name="TextBox 10">
+            <a:extLst>
+              <a:ext uri="{FF2B5EF4-FFF2-40B4-BE49-F238E27FC236}">
+                <a16:creationId xmlns:a16="http://schemas.microsoft.com/office/drawing/2014/main" id="{68BB4828-5E7D-F4FB-D66E-549A25EF2E54}"/>
+              </a:ext>
+            </a:extLst>
+          </p:cNvPr>
+          <p:cNvSpPr txBox="1"/>
+          <p:nvPr/>
+        </p:nvSpPr>
+        <p:spPr>
+          <a:xfrm>
+            <a:off x="6679734" y="3030286"/>
+            <a:ext cx="645952" cy="338554"/>
+          </a:xfrm>
+          <a:prstGeom prst="rect">
+            <a:avLst/>
+          </a:prstGeom>
+          <a:noFill/>
+        </p:spPr>
+        <p:txBody>
+          <a:bodyPr wrap="square" rtlCol="0">
+            <a:spAutoFit/>
+          </a:bodyPr>
+          <a:lstStyle/>
+          <a:p>
+            <a:pPr algn="ctr"/>
+            <a:r>
+              <a:rPr lang="en-GB" sz="1600" i="1" dirty="0">
+                <a:latin typeface="Abadi" panose="020B0604020104020204" pitchFamily="34" charset="0"/>
+              </a:rPr>
+              <a:t>Max</a:t>
+            </a:r>
+          </a:p>
+        </p:txBody>
+      </p:sp>
+      <p:sp>
+        <p:nvSpPr>
+          <p:cNvPr id="12" name="TextBox 11">
+            <a:extLst>
+              <a:ext uri="{FF2B5EF4-FFF2-40B4-BE49-F238E27FC236}">
+                <a16:creationId xmlns:a16="http://schemas.microsoft.com/office/drawing/2014/main" id="{E83F0DF6-BBD1-47DB-1DC1-876DE197FA28}"/>
+              </a:ext>
+            </a:extLst>
+          </p:cNvPr>
+          <p:cNvSpPr txBox="1"/>
+          <p:nvPr/>
+        </p:nvSpPr>
+        <p:spPr>
+          <a:xfrm>
+            <a:off x="6656664" y="5090507"/>
+            <a:ext cx="645952" cy="338554"/>
+          </a:xfrm>
+          <a:prstGeom prst="rect">
+            <a:avLst/>
+          </a:prstGeom>
+          <a:noFill/>
+        </p:spPr>
+        <p:txBody>
+          <a:bodyPr wrap="square" rtlCol="0">
+            <a:spAutoFit/>
+          </a:bodyPr>
+          <a:lstStyle/>
+          <a:p>
+            <a:pPr algn="ctr"/>
+            <a:r>
+              <a:rPr lang="en-GB" sz="1600" i="1" dirty="0">
+                <a:latin typeface="Abadi" panose="020B0604020104020204" pitchFamily="34" charset="0"/>
+              </a:rPr>
+              <a:t>Min</a:t>
+            </a:r>
+          </a:p>
+        </p:txBody>
+      </p:sp>
+      <p:sp>
+        <p:nvSpPr>
+          <p:cNvPr id="13" name="Oval 12">
+            <a:extLst>
+              <a:ext uri="{FF2B5EF4-FFF2-40B4-BE49-F238E27FC236}">
+                <a16:creationId xmlns:a16="http://schemas.microsoft.com/office/drawing/2014/main" id="{3F1B017F-3968-0250-56D2-CAD8A1BE5964}"/>
+              </a:ext>
+            </a:extLst>
+          </p:cNvPr>
+          <p:cNvSpPr/>
+          <p:nvPr/>
+        </p:nvSpPr>
+        <p:spPr>
+          <a:xfrm rot="18716047">
+            <a:off x="4161086" y="4486516"/>
+            <a:ext cx="1434517" cy="557036"/>
+          </a:xfrm>
+          <a:prstGeom prst="ellipse">
+            <a:avLst/>
+          </a:prstGeom>
+          <a:noFill/>
+          <a:ln w="28575">
+            <a:solidFill>
+              <a:schemeClr val="accent2"/>
+            </a:solidFill>
+          </a:ln>
+        </p:spPr>
+        <p:style>
+          <a:lnRef idx="2">
+            <a:schemeClr val="accent1">
+              <a:shade val="50000"/>
+            </a:schemeClr>
+          </a:lnRef>
+          <a:fillRef idx="1">
+            <a:schemeClr val="accent1"/>
+          </a:fillRef>
+          <a:effectRef idx="0">
+            <a:schemeClr val="accent1"/>
+          </a:effectRef>
+          <a:fontRef idx="minor">
+            <a:schemeClr val="lt1"/>
+          </a:fontRef>
+        </p:style>
+        <p:txBody>
+          <a:bodyPr rtlCol="0" anchor="ctr"/>
+          <a:lstStyle/>
+          <a:p>
+            <a:pPr algn="ctr"/>
+            <a:endParaRPr lang="en-GB"/>
+          </a:p>
+        </p:txBody>
+      </p:sp>
+      <p:sp>
+        <p:nvSpPr>
+          <p:cNvPr id="14" name="Callout: Line 13">
+            <a:extLst>
+              <a:ext uri="{FF2B5EF4-FFF2-40B4-BE49-F238E27FC236}">
+                <a16:creationId xmlns:a16="http://schemas.microsoft.com/office/drawing/2014/main" id="{9E27C24C-6C3B-5AE7-D537-29059D728C0D}"/>
+              </a:ext>
+            </a:extLst>
+          </p:cNvPr>
+          <p:cNvSpPr/>
+          <p:nvPr/>
+        </p:nvSpPr>
+        <p:spPr>
+          <a:xfrm>
+            <a:off x="2687233" y="3368840"/>
+            <a:ext cx="1373040" cy="648050"/>
+          </a:xfrm>
+          <a:prstGeom prst="borderCallout1">
+            <a:avLst>
+              <a:gd name="adj1" fmla="val 45934"/>
+              <a:gd name="adj2" fmla="val 99786"/>
+              <a:gd name="adj3" fmla="val 152629"/>
+              <a:gd name="adj4" fmla="val 158179"/>
+            </a:avLst>
+          </a:prstGeom>
+          <a:noFill/>
+          <a:ln>
+            <a:solidFill>
+              <a:schemeClr val="accent2"/>
+            </a:solidFill>
+            <a:headEnd type="none" w="med" len="med"/>
+            <a:tailEnd type="triangle" w="med" len="med"/>
+          </a:ln>
+        </p:spPr>
+        <p:style>
+          <a:lnRef idx="2">
+            <a:schemeClr val="accent1">
+              <a:shade val="50000"/>
+            </a:schemeClr>
+          </a:lnRef>
+          <a:fillRef idx="1">
+            <a:schemeClr val="accent1"/>
+          </a:fillRef>
+          <a:effectRef idx="0">
+            <a:schemeClr val="accent1"/>
+          </a:effectRef>
+          <a:fontRef idx="minor">
+            <a:schemeClr val="lt1"/>
+          </a:fontRef>
+        </p:style>
+        <p:txBody>
+          <a:bodyPr rtlCol="0" anchor="ctr"/>
+          <a:lstStyle/>
+          <a:p>
+            <a:pPr algn="ctr"/>
+            <a:r>
+              <a:rPr lang="en-GB" dirty="0">
+                <a:solidFill>
+                  <a:schemeClr val="accent2"/>
+                </a:solidFill>
+              </a:rPr>
+              <a:t>S2S forecasts</a:t>
+            </a:r>
+          </a:p>
+        </p:txBody>
+      </p:sp>
+      <p:sp>
+        <p:nvSpPr>
+          <p:cNvPr id="2" name="TextBox 1">
+            <a:extLst>
+              <a:ext uri="{FF2B5EF4-FFF2-40B4-BE49-F238E27FC236}">
+                <a16:creationId xmlns:a16="http://schemas.microsoft.com/office/drawing/2014/main" id="{DD479588-5E62-EF56-7DAE-91D8F700BFC1}"/>
+              </a:ext>
+            </a:extLst>
+          </p:cNvPr>
+          <p:cNvSpPr txBox="1"/>
+          <p:nvPr/>
+        </p:nvSpPr>
+        <p:spPr>
+          <a:xfrm>
+            <a:off x="3014039" y="5484740"/>
+            <a:ext cx="494950" cy="369332"/>
+          </a:xfrm>
+          <a:prstGeom prst="rect">
+            <a:avLst/>
+          </a:prstGeom>
+          <a:noFill/>
+        </p:spPr>
+        <p:txBody>
+          <a:bodyPr wrap="square" rtlCol="0">
+            <a:spAutoFit/>
+          </a:bodyPr>
+          <a:lstStyle/>
+          <a:p>
+            <a:r>
+              <a:rPr lang="en-GB" dirty="0"/>
+              <a:t>10</a:t>
+            </a:r>
+          </a:p>
+        </p:txBody>
+      </p:sp>
+      <p:sp>
+        <p:nvSpPr>
+          <p:cNvPr id="3" name="TextBox 2">
+            <a:extLst>
+              <a:ext uri="{FF2B5EF4-FFF2-40B4-BE49-F238E27FC236}">
+                <a16:creationId xmlns:a16="http://schemas.microsoft.com/office/drawing/2014/main" id="{1A62328C-23BF-D754-102E-250012E081CD}"/>
+              </a:ext>
+            </a:extLst>
+          </p:cNvPr>
+          <p:cNvSpPr txBox="1"/>
+          <p:nvPr/>
+        </p:nvSpPr>
+        <p:spPr>
+          <a:xfrm>
+            <a:off x="4986850" y="5483809"/>
+            <a:ext cx="494950" cy="369332"/>
+          </a:xfrm>
+          <a:prstGeom prst="rect">
+            <a:avLst/>
+          </a:prstGeom>
+          <a:noFill/>
+        </p:spPr>
+        <p:txBody>
+          <a:bodyPr wrap="square" rtlCol="0">
+            <a:spAutoFit/>
+          </a:bodyPr>
+          <a:lstStyle/>
+          <a:p>
+            <a:r>
+              <a:rPr lang="en-GB" dirty="0"/>
+              <a:t>20</a:t>
+            </a:r>
+          </a:p>
+        </p:txBody>
+      </p:sp>
+      <p:sp>
+        <p:nvSpPr>
+          <p:cNvPr id="4" name="TextBox 3">
+            <a:extLst>
+              <a:ext uri="{FF2B5EF4-FFF2-40B4-BE49-F238E27FC236}">
+                <a16:creationId xmlns:a16="http://schemas.microsoft.com/office/drawing/2014/main" id="{0100443F-3887-CE12-24CE-344C826AB266}"/>
+              </a:ext>
+            </a:extLst>
+          </p:cNvPr>
+          <p:cNvSpPr txBox="1"/>
+          <p:nvPr/>
+        </p:nvSpPr>
+        <p:spPr>
+          <a:xfrm>
+            <a:off x="6838141" y="5483809"/>
+            <a:ext cx="494950" cy="369332"/>
+          </a:xfrm>
+          <a:prstGeom prst="rect">
+            <a:avLst/>
+          </a:prstGeom>
+          <a:noFill/>
+        </p:spPr>
+        <p:txBody>
+          <a:bodyPr wrap="square" rtlCol="0">
+            <a:spAutoFit/>
+          </a:bodyPr>
+          <a:lstStyle/>
+          <a:p>
+            <a:r>
+              <a:rPr lang="en-GB" dirty="0"/>
+              <a:t>30</a:t>
+            </a:r>
+          </a:p>
+        </p:txBody>
+      </p:sp>
+      <p:sp>
+        <p:nvSpPr>
+          <p:cNvPr id="6" name="TextBox 5">
+            <a:extLst>
+              <a:ext uri="{FF2B5EF4-FFF2-40B4-BE49-F238E27FC236}">
+                <a16:creationId xmlns:a16="http://schemas.microsoft.com/office/drawing/2014/main" id="{3CE9C810-17C9-2B34-8EA9-06896DC79794}"/>
+              </a:ext>
+            </a:extLst>
+          </p:cNvPr>
+          <p:cNvSpPr txBox="1"/>
+          <p:nvPr/>
+        </p:nvSpPr>
+        <p:spPr>
+          <a:xfrm>
+            <a:off x="8683011" y="5483809"/>
+            <a:ext cx="494950" cy="369332"/>
+          </a:xfrm>
+          <a:prstGeom prst="rect">
+            <a:avLst/>
+          </a:prstGeom>
+          <a:noFill/>
+        </p:spPr>
+        <p:txBody>
+          <a:bodyPr wrap="square" rtlCol="0">
+            <a:spAutoFit/>
+          </a:bodyPr>
+          <a:lstStyle/>
+          <a:p>
+            <a:r>
+              <a:rPr lang="en-GB" dirty="0"/>
+              <a:t>40</a:t>
+            </a:r>
+          </a:p>
+        </p:txBody>
+      </p:sp>
+      <p:sp>
+        <p:nvSpPr>
+          <p:cNvPr id="7" name="TextBox 6">
+            <a:extLst>
+              <a:ext uri="{FF2B5EF4-FFF2-40B4-BE49-F238E27FC236}">
+                <a16:creationId xmlns:a16="http://schemas.microsoft.com/office/drawing/2014/main" id="{AE5624F2-BC40-AFC6-0FAE-14FEFC6202B6}"/>
+              </a:ext>
+            </a:extLst>
+          </p:cNvPr>
+          <p:cNvSpPr txBox="1"/>
+          <p:nvPr/>
+        </p:nvSpPr>
+        <p:spPr>
+          <a:xfrm>
+            <a:off x="10615863" y="5483809"/>
+            <a:ext cx="494950" cy="369332"/>
+          </a:xfrm>
+          <a:prstGeom prst="rect">
+            <a:avLst/>
+          </a:prstGeom>
+          <a:noFill/>
+        </p:spPr>
+        <p:txBody>
+          <a:bodyPr wrap="square" rtlCol="0">
+            <a:spAutoFit/>
+          </a:bodyPr>
+          <a:lstStyle/>
+          <a:p>
+            <a:r>
+              <a:rPr lang="en-GB" dirty="0"/>
+              <a:t>50</a:t>
+            </a:r>
+          </a:p>
+        </p:txBody>
+      </p:sp>
+      <p:sp>
+        <p:nvSpPr>
+          <p:cNvPr id="16" name="TextBox 15">
+            <a:extLst>
+              <a:ext uri="{FF2B5EF4-FFF2-40B4-BE49-F238E27FC236}">
+                <a16:creationId xmlns:a16="http://schemas.microsoft.com/office/drawing/2014/main" id="{B98A2C33-0C14-49CC-F40A-C60A46078EF5}"/>
+              </a:ext>
+            </a:extLst>
+          </p:cNvPr>
+          <p:cNvSpPr txBox="1"/>
+          <p:nvPr/>
+        </p:nvSpPr>
+        <p:spPr>
+          <a:xfrm>
+            <a:off x="5081427" y="5807379"/>
+            <a:ext cx="2626160" cy="369332"/>
+          </a:xfrm>
+          <a:prstGeom prst="rect">
+            <a:avLst/>
+          </a:prstGeom>
+          <a:noFill/>
+        </p:spPr>
+        <p:txBody>
+          <a:bodyPr wrap="square" rtlCol="0">
+            <a:spAutoFit/>
+          </a:bodyPr>
+          <a:lstStyle/>
+          <a:p>
+            <a:pPr algn="ctr"/>
+            <a:r>
+              <a:rPr lang="en-GB" dirty="0"/>
+              <a:t>Week in the year</a:t>
+            </a:r>
+          </a:p>
+        </p:txBody>
+      </p:sp>
+    </p:spTree>
+    <p:extLst>
+      <p:ext uri="{BB962C8B-B14F-4D97-AF65-F5344CB8AC3E}">
+        <p14:creationId xmlns:p14="http://schemas.microsoft.com/office/powerpoint/2010/main" val="4241947628"/>
+      </p:ext>
+    </p:extLst>
+  </p:cSld>
+  <p:clrMapOvr>
+    <a:masterClrMapping/>
+  </p:clrMapOvr>
+</p:sld>
+</file>
+
+<file path=ppt/slides/slide2.xml><?xml version="1.0" encoding="utf-8"?>
+<p:sld xmlns:a="http://schemas.openxmlformats.org/drawingml/2006/main" xmlns:r="http://schemas.openxmlformats.org/officeDocument/2006/relationships" xmlns:p="http://schemas.openxmlformats.org/presentationml/2006/main">
+  <p:cSld>
+    <p:spTree>
+      <p:nvGrpSpPr>
+        <p:cNvPr id="1" name=""/>
+        <p:cNvGrpSpPr/>
+        <p:nvPr/>
+      </p:nvGrpSpPr>
+      <p:grpSpPr>
+        <a:xfrm>
+          <a:off x="0" y="0"/>
+          <a:ext cx="0" cy="0"/>
+          <a:chOff x="0" y="0"/>
+          <a:chExt cx="0" cy="0"/>
+        </a:xfrm>
+      </p:grpSpPr>
       <p:grpSp>
         <p:nvGrpSpPr>
-          <p:cNvPr id="15" name="Group 14">
-            <a:extLst>
-              <a:ext uri="{FF2B5EF4-FFF2-40B4-BE49-F238E27FC236}">
-                <a16:creationId xmlns:a16="http://schemas.microsoft.com/office/drawing/2014/main" id="{E4FBBE3E-C766-76B3-43D9-96084B8E9CD7}"/>
+          <p:cNvPr id="43" name="Group 42">
+            <a:extLst>
+              <a:ext uri="{FF2B5EF4-FFF2-40B4-BE49-F238E27FC236}">
+                <a16:creationId xmlns:a16="http://schemas.microsoft.com/office/drawing/2014/main" id="{720B3FC5-3133-BE93-C371-D27549D74657}"/>
               </a:ext>
             </a:extLst>
           </p:cNvPr>
@@ -3361,18 +3941,18 @@
         </p:nvGrpSpPr>
         <p:grpSpPr>
           <a:xfrm>
-            <a:off x="527860" y="1004549"/>
-            <a:ext cx="11136279" cy="4848902"/>
-            <a:chOff x="527860" y="1004549"/>
-            <a:chExt cx="11136279" cy="4848902"/>
+            <a:off x="81431" y="921151"/>
+            <a:ext cx="11839325" cy="5138270"/>
+            <a:chOff x="81431" y="921151"/>
+            <a:chExt cx="11839325" cy="5138270"/>
           </a:xfrm>
         </p:grpSpPr>
         <p:pic>
           <p:nvPicPr>
-            <p:cNvPr id="5" name="Picture 4" descr="Median">
+            <p:cNvPr id="3" name="Picture 2" descr="A graph showing a number of graphs&#10;&#10;Description automatically generated with medium confidence">
               <a:extLst>
                 <a:ext uri="{FF2B5EF4-FFF2-40B4-BE49-F238E27FC236}">
-                  <a16:creationId xmlns:a16="http://schemas.microsoft.com/office/drawing/2014/main" id="{CFF44B28-DDB9-F2DB-33C0-6BA156E3B4CC}"/>
+                  <a16:creationId xmlns:a16="http://schemas.microsoft.com/office/drawing/2014/main" id="{77F093AA-CFF0-FDE1-E1FC-07DA692CE3C2}"/>
                 </a:ext>
               </a:extLst>
             </p:cNvPr>
@@ -3382,15 +3962,21 @@
             <p:nvPr/>
           </p:nvPicPr>
           <p:blipFill>
-            <a:blip r:embed="rId2"/>
+            <a:blip r:embed="rId2">
+              <a:extLst>
+                <a:ext uri="{28A0092B-C50C-407E-A947-70E740481C1C}">
+                  <a14:useLocalDpi xmlns:a14="http://schemas.microsoft.com/office/drawing/2010/main" val="0"/>
+                </a:ext>
+              </a:extLst>
+            </a:blip>
             <a:stretch>
               <a:fillRect/>
             </a:stretch>
           </p:blipFill>
           <p:spPr>
             <a:xfrm>
-              <a:off x="527860" y="1004549"/>
-              <a:ext cx="11136279" cy="4848902"/>
+              <a:off x="81431" y="921151"/>
+              <a:ext cx="10459626" cy="4521847"/>
             </a:xfrm>
             <a:prstGeom prst="rect">
               <a:avLst/>
@@ -3399,200 +3985,10 @@
         </p:pic>
         <p:sp>
           <p:nvSpPr>
-            <p:cNvPr id="8" name="TextBox 7">
+            <p:cNvPr id="4" name="Oval 3">
               <a:extLst>
                 <a:ext uri="{FF2B5EF4-FFF2-40B4-BE49-F238E27FC236}">
-                  <a16:creationId xmlns:a16="http://schemas.microsoft.com/office/drawing/2014/main" id="{E33A3626-B1EF-06CA-5BF1-B01881D29987}"/>
-                </a:ext>
-              </a:extLst>
-            </p:cNvPr>
-            <p:cNvSpPr txBox="1"/>
-            <p:nvPr/>
-          </p:nvSpPr>
-          <p:spPr>
-            <a:xfrm>
-              <a:off x="6582562" y="4457257"/>
-              <a:ext cx="840297" cy="307777"/>
-            </a:xfrm>
-            <a:prstGeom prst="rect">
-              <a:avLst/>
-            </a:prstGeom>
-            <a:noFill/>
-          </p:spPr>
-          <p:txBody>
-            <a:bodyPr wrap="square" rtlCol="0">
-              <a:spAutoFit/>
-            </a:bodyPr>
-            <a:lstStyle/>
-            <a:p>
-              <a:pPr algn="ctr"/>
-              <a:r>
-                <a:rPr lang="en-GB" sz="1400" i="1" dirty="0">
-                  <a:latin typeface="Abadi" panose="020B0604020104020204" pitchFamily="34" charset="0"/>
-                </a:rPr>
-                <a:t>Median</a:t>
-              </a:r>
-            </a:p>
-          </p:txBody>
-        </p:sp>
-        <p:sp>
-          <p:nvSpPr>
-            <p:cNvPr id="9" name="TextBox 8">
-              <a:extLst>
-                <a:ext uri="{FF2B5EF4-FFF2-40B4-BE49-F238E27FC236}">
-                  <a16:creationId xmlns:a16="http://schemas.microsoft.com/office/drawing/2014/main" id="{BB1B7C81-B949-F830-3322-35522635582C}"/>
-                </a:ext>
-              </a:extLst>
-            </p:cNvPr>
-            <p:cNvSpPr txBox="1"/>
-            <p:nvPr/>
-          </p:nvSpPr>
-          <p:spPr>
-            <a:xfrm>
-              <a:off x="6394507" y="4757104"/>
-              <a:ext cx="1044503" cy="307777"/>
-            </a:xfrm>
-            <a:prstGeom prst="rect">
-              <a:avLst/>
-            </a:prstGeom>
-            <a:noFill/>
-          </p:spPr>
-          <p:txBody>
-            <a:bodyPr wrap="square" rtlCol="0">
-              <a:spAutoFit/>
-            </a:bodyPr>
-            <a:lstStyle/>
-            <a:p>
-              <a:pPr algn="ctr"/>
-              <a:r>
-                <a:rPr lang="en-GB" sz="1400" i="1" dirty="0">
-                  <a:latin typeface="Abadi" panose="020B0604020104020204" pitchFamily="34" charset="0"/>
-                </a:rPr>
-                <a:t>25 Perc.</a:t>
-              </a:r>
-            </a:p>
-          </p:txBody>
-        </p:sp>
-        <p:sp>
-          <p:nvSpPr>
-            <p:cNvPr id="10" name="TextBox 9">
-              <a:extLst>
-                <a:ext uri="{FF2B5EF4-FFF2-40B4-BE49-F238E27FC236}">
-                  <a16:creationId xmlns:a16="http://schemas.microsoft.com/office/drawing/2014/main" id="{8214ECED-0396-6886-7B3F-E4BDC9AA7610}"/>
-                </a:ext>
-              </a:extLst>
-            </p:cNvPr>
-            <p:cNvSpPr txBox="1"/>
-            <p:nvPr/>
-          </p:nvSpPr>
-          <p:spPr>
-            <a:xfrm>
-              <a:off x="6545509" y="3877579"/>
-              <a:ext cx="1044504" cy="307777"/>
-            </a:xfrm>
-            <a:prstGeom prst="rect">
-              <a:avLst/>
-            </a:prstGeom>
-            <a:noFill/>
-          </p:spPr>
-          <p:txBody>
-            <a:bodyPr wrap="square" rtlCol="0">
-              <a:spAutoFit/>
-            </a:bodyPr>
-            <a:lstStyle/>
-            <a:p>
-              <a:pPr algn="ctr"/>
-              <a:r>
-                <a:rPr lang="en-GB" sz="1400" i="1" dirty="0">
-                  <a:latin typeface="Abadi" panose="020B0604020104020204" pitchFamily="34" charset="0"/>
-                </a:rPr>
-                <a:t>75 Perc.</a:t>
-              </a:r>
-            </a:p>
-          </p:txBody>
-        </p:sp>
-        <p:sp>
-          <p:nvSpPr>
-            <p:cNvPr id="11" name="TextBox 10">
-              <a:extLst>
-                <a:ext uri="{FF2B5EF4-FFF2-40B4-BE49-F238E27FC236}">
-                  <a16:creationId xmlns:a16="http://schemas.microsoft.com/office/drawing/2014/main" id="{68BB4828-5E7D-F4FB-D66E-549A25EF2E54}"/>
-                </a:ext>
-              </a:extLst>
-            </p:cNvPr>
-            <p:cNvSpPr txBox="1"/>
-            <p:nvPr/>
-          </p:nvSpPr>
-          <p:spPr>
-            <a:xfrm>
-              <a:off x="6679734" y="3030286"/>
-              <a:ext cx="645952" cy="338554"/>
-            </a:xfrm>
-            <a:prstGeom prst="rect">
-              <a:avLst/>
-            </a:prstGeom>
-            <a:noFill/>
-          </p:spPr>
-          <p:txBody>
-            <a:bodyPr wrap="square" rtlCol="0">
-              <a:spAutoFit/>
-            </a:bodyPr>
-            <a:lstStyle/>
-            <a:p>
-              <a:pPr algn="ctr"/>
-              <a:r>
-                <a:rPr lang="en-GB" sz="1600" i="1" dirty="0">
-                  <a:latin typeface="Abadi" panose="020B0604020104020204" pitchFamily="34" charset="0"/>
-                </a:rPr>
-                <a:t>Max</a:t>
-              </a:r>
-            </a:p>
-          </p:txBody>
-        </p:sp>
-        <p:sp>
-          <p:nvSpPr>
-            <p:cNvPr id="12" name="TextBox 11">
-              <a:extLst>
-                <a:ext uri="{FF2B5EF4-FFF2-40B4-BE49-F238E27FC236}">
-                  <a16:creationId xmlns:a16="http://schemas.microsoft.com/office/drawing/2014/main" id="{E83F0DF6-BBD1-47DB-1DC1-876DE197FA28}"/>
-                </a:ext>
-              </a:extLst>
-            </p:cNvPr>
-            <p:cNvSpPr txBox="1"/>
-            <p:nvPr/>
-          </p:nvSpPr>
-          <p:spPr>
-            <a:xfrm>
-              <a:off x="6656664" y="5090507"/>
-              <a:ext cx="645952" cy="338554"/>
-            </a:xfrm>
-            <a:prstGeom prst="rect">
-              <a:avLst/>
-            </a:prstGeom>
-            <a:noFill/>
-          </p:spPr>
-          <p:txBody>
-            <a:bodyPr wrap="square" rtlCol="0">
-              <a:spAutoFit/>
-            </a:bodyPr>
-            <a:lstStyle/>
-            <a:p>
-              <a:pPr algn="ctr"/>
-              <a:r>
-                <a:rPr lang="en-GB" sz="1600" i="1" dirty="0">
-                  <a:latin typeface="Abadi" panose="020B0604020104020204" pitchFamily="34" charset="0"/>
-                </a:rPr>
-                <a:t>Min</a:t>
-              </a:r>
-            </a:p>
-          </p:txBody>
-        </p:sp>
-        <p:sp>
-          <p:nvSpPr>
-            <p:cNvPr id="13" name="Oval 12">
-              <a:extLst>
-                <a:ext uri="{FF2B5EF4-FFF2-40B4-BE49-F238E27FC236}">
-                  <a16:creationId xmlns:a16="http://schemas.microsoft.com/office/drawing/2014/main" id="{3F1B017F-3968-0250-56D2-CAD8A1BE5964}"/>
+                  <a16:creationId xmlns:a16="http://schemas.microsoft.com/office/drawing/2014/main" id="{9F6FE8E0-282A-1E79-76F8-2E90276D5822}"/>
                 </a:ext>
               </a:extLst>
             </p:cNvPr>
@@ -3600,9 +3996,9 @@
             <p:nvPr/>
           </p:nvSpPr>
           <p:spPr>
-            <a:xfrm rot="18716047">
-              <a:off x="4161086" y="4486516"/>
-              <a:ext cx="1434517" cy="557036"/>
+            <a:xfrm rot="3302818">
+              <a:off x="6738764" y="4144986"/>
+              <a:ext cx="1159384" cy="598618"/>
             </a:xfrm>
             <a:prstGeom prst="ellipse">
               <a:avLst/>
@@ -3610,7 +4006,7 @@
             <a:noFill/>
             <a:ln w="28575">
               <a:solidFill>
-                <a:schemeClr val="accent2"/>
+                <a:schemeClr val="tx1"/>
               </a:solidFill>
             </a:ln>
           </p:spPr>
@@ -3635,16 +4031,20 @@
             <a:lstStyle/>
             <a:p>
               <a:pPr algn="ctr"/>
-              <a:endParaRPr lang="en-GB"/>
+              <a:endParaRPr lang="en-GB">
+                <a:solidFill>
+                  <a:schemeClr val="tx1"/>
+                </a:solidFill>
+              </a:endParaRPr>
             </a:p>
           </p:txBody>
         </p:sp>
         <p:sp>
           <p:nvSpPr>
-            <p:cNvPr id="14" name="Callout: Line 13">
+            <p:cNvPr id="5" name="Callout: Line 4">
               <a:extLst>
                 <a:ext uri="{FF2B5EF4-FFF2-40B4-BE49-F238E27FC236}">
-                  <a16:creationId xmlns:a16="http://schemas.microsoft.com/office/drawing/2014/main" id="{9E27C24C-6C3B-5AE7-D537-29059D728C0D}"/>
+                  <a16:creationId xmlns:a16="http://schemas.microsoft.com/office/drawing/2014/main" id="{EA39AE09-D2D4-DC8C-ECE4-35385FE845DB}"/>
                 </a:ext>
               </a:extLst>
             </p:cNvPr>
@@ -3653,21 +4053,21 @@
           </p:nvSpPr>
           <p:spPr>
             <a:xfrm>
-              <a:off x="2687233" y="3368840"/>
+              <a:off x="8031020" y="5399596"/>
               <a:ext cx="1373040" cy="648050"/>
             </a:xfrm>
             <a:prstGeom prst="borderCallout1">
               <a:avLst>
-                <a:gd name="adj1" fmla="val 45934"/>
-                <a:gd name="adj2" fmla="val 99786"/>
-                <a:gd name="adj3" fmla="val 152629"/>
-                <a:gd name="adj4" fmla="val 158179"/>
+                <a:gd name="adj1" fmla="val -1963"/>
+                <a:gd name="adj2" fmla="val 50297"/>
+                <a:gd name="adj3" fmla="val -80381"/>
+                <a:gd name="adj4" fmla="val -25115"/>
               </a:avLst>
             </a:prstGeom>
             <a:noFill/>
             <a:ln>
               <a:solidFill>
-                <a:schemeClr val="accent2"/>
+                <a:schemeClr val="tx1"/>
               </a:solidFill>
               <a:headEnd type="none" w="med" len="med"/>
               <a:tailEnd type="triangle" w="med" len="med"/>
@@ -3697,230 +4097,871 @@
               <a:r>
                 <a:rPr lang="en-GB" dirty="0">
                   <a:solidFill>
-                    <a:schemeClr val="accent2"/>
+                    <a:schemeClr val="tx1"/>
                   </a:solidFill>
                 </a:rPr>
-                <a:t>S2S forecasts</a:t>
+                <a:t>Current S2S forecasts</a:t>
+              </a:r>
+            </a:p>
+          </p:txBody>
+        </p:sp>
+        <p:sp>
+          <p:nvSpPr>
+            <p:cNvPr id="6" name="Callout: Line 5">
+              <a:extLst>
+                <a:ext uri="{FF2B5EF4-FFF2-40B4-BE49-F238E27FC236}">
+                  <a16:creationId xmlns:a16="http://schemas.microsoft.com/office/drawing/2014/main" id="{806DABEE-25A8-2DA5-BC2D-AE3C7281F444}"/>
+                </a:ext>
+              </a:extLst>
+            </p:cNvPr>
+            <p:cNvSpPr/>
+            <p:nvPr/>
+          </p:nvSpPr>
+          <p:spPr>
+            <a:xfrm>
+              <a:off x="3120705" y="5411371"/>
+              <a:ext cx="2130803" cy="648050"/>
+            </a:xfrm>
+            <a:prstGeom prst="borderCallout1">
+              <a:avLst>
+                <a:gd name="adj1" fmla="val -1963"/>
+                <a:gd name="adj2" fmla="val 50297"/>
+                <a:gd name="adj3" fmla="val -67436"/>
+                <a:gd name="adj4" fmla="val 93839"/>
+              </a:avLst>
+            </a:prstGeom>
+            <a:noFill/>
+            <a:ln w="9525">
+              <a:solidFill>
+                <a:srgbClr val="FF0000"/>
+              </a:solidFill>
+              <a:headEnd type="none" w="med" len="med"/>
+              <a:tailEnd type="triangle" w="med" len="med"/>
+            </a:ln>
+          </p:spPr>
+          <p:style>
+            <a:lnRef idx="2">
+              <a:schemeClr val="accent1">
+                <a:shade val="50000"/>
+              </a:schemeClr>
+            </a:lnRef>
+            <a:fillRef idx="1">
+              <a:schemeClr val="accent1"/>
+            </a:fillRef>
+            <a:effectRef idx="0">
+              <a:schemeClr val="accent1"/>
+            </a:effectRef>
+            <a:fontRef idx="minor">
+              <a:schemeClr val="lt1"/>
+            </a:fontRef>
+          </p:style>
+          <p:txBody>
+            <a:bodyPr rtlCol="0" anchor="ctr"/>
+            <a:lstStyle/>
+            <a:p>
+              <a:pPr algn="ctr"/>
+              <a:r>
+                <a:rPr lang="en-GB" sz="1600" dirty="0">
+                  <a:solidFill>
+                    <a:srgbClr val="FF0000"/>
+                  </a:solidFill>
+                </a:rPr>
+                <a:t>Observed values from weather stations</a:t>
+              </a:r>
+            </a:p>
+          </p:txBody>
+        </p:sp>
+        <p:cxnSp>
+          <p:nvCxnSpPr>
+            <p:cNvPr id="8" name="Straight Arrow Connector 7">
+              <a:extLst>
+                <a:ext uri="{FF2B5EF4-FFF2-40B4-BE49-F238E27FC236}">
+                  <a16:creationId xmlns:a16="http://schemas.microsoft.com/office/drawing/2014/main" id="{D37BE834-0F5F-18E3-E361-A6B11A36C03B}"/>
+                </a:ext>
+              </a:extLst>
+            </p:cNvPr>
+            <p:cNvCxnSpPr>
+              <a:cxnSpLocks/>
+              <a:stCxn id="6" idx="3"/>
+            </p:cNvCxnSpPr>
+            <p:nvPr/>
+          </p:nvCxnSpPr>
+          <p:spPr>
+            <a:xfrm flipV="1">
+              <a:off x="4186107" y="4026716"/>
+              <a:ext cx="1065401" cy="1384655"/>
+            </a:xfrm>
+            <a:prstGeom prst="straightConnector1">
+              <a:avLst/>
+            </a:prstGeom>
+            <a:ln>
+              <a:solidFill>
+                <a:srgbClr val="FF0000"/>
+              </a:solidFill>
+              <a:tailEnd type="triangle"/>
+            </a:ln>
+          </p:spPr>
+          <p:style>
+            <a:lnRef idx="1">
+              <a:schemeClr val="accent1"/>
+            </a:lnRef>
+            <a:fillRef idx="0">
+              <a:schemeClr val="accent1"/>
+            </a:fillRef>
+            <a:effectRef idx="0">
+              <a:schemeClr val="accent1"/>
+            </a:effectRef>
+            <a:fontRef idx="minor">
+              <a:schemeClr val="tx1"/>
+            </a:fontRef>
+          </p:style>
+        </p:cxnSp>
+        <p:cxnSp>
+          <p:nvCxnSpPr>
+            <p:cNvPr id="10" name="Straight Arrow Connector 9">
+              <a:extLst>
+                <a:ext uri="{FF2B5EF4-FFF2-40B4-BE49-F238E27FC236}">
+                  <a16:creationId xmlns:a16="http://schemas.microsoft.com/office/drawing/2014/main" id="{8B48D4EC-F6DA-54ED-746B-6CD2BB52B421}"/>
+                </a:ext>
+              </a:extLst>
+            </p:cNvPr>
+            <p:cNvCxnSpPr>
+              <a:cxnSpLocks/>
+              <a:stCxn id="6" idx="3"/>
+            </p:cNvCxnSpPr>
+            <p:nvPr/>
+          </p:nvCxnSpPr>
+          <p:spPr>
+            <a:xfrm flipV="1">
+              <a:off x="4186107" y="4999839"/>
+              <a:ext cx="1417923" cy="411532"/>
+            </a:xfrm>
+            <a:prstGeom prst="straightConnector1">
+              <a:avLst/>
+            </a:prstGeom>
+            <a:ln>
+              <a:solidFill>
+                <a:srgbClr val="FF0000"/>
+              </a:solidFill>
+              <a:tailEnd type="triangle"/>
+            </a:ln>
+          </p:spPr>
+          <p:style>
+            <a:lnRef idx="1">
+              <a:schemeClr val="accent1"/>
+            </a:lnRef>
+            <a:fillRef idx="0">
+              <a:schemeClr val="accent1"/>
+            </a:fillRef>
+            <a:effectRef idx="0">
+              <a:schemeClr val="accent1"/>
+            </a:effectRef>
+            <a:fontRef idx="minor">
+              <a:schemeClr val="tx1"/>
+            </a:fontRef>
+          </p:style>
+        </p:cxnSp>
+        <p:sp>
+          <p:nvSpPr>
+            <p:cNvPr id="16" name="Callout: Line 15">
+              <a:extLst>
+                <a:ext uri="{FF2B5EF4-FFF2-40B4-BE49-F238E27FC236}">
+                  <a16:creationId xmlns:a16="http://schemas.microsoft.com/office/drawing/2014/main" id="{35BCDDA5-076A-27A1-3565-8FC83BA60C4F}"/>
+                </a:ext>
+              </a:extLst>
+            </p:cNvPr>
+            <p:cNvSpPr/>
+            <p:nvPr/>
+          </p:nvSpPr>
+          <p:spPr>
+            <a:xfrm>
+              <a:off x="1606452" y="2339013"/>
+              <a:ext cx="1373040" cy="648050"/>
+            </a:xfrm>
+            <a:prstGeom prst="borderCallout1">
+              <a:avLst>
+                <a:gd name="adj1" fmla="val 54995"/>
+                <a:gd name="adj2" fmla="val 101619"/>
+                <a:gd name="adj3" fmla="val 81432"/>
+                <a:gd name="adj4" fmla="val 144126"/>
+              </a:avLst>
+            </a:prstGeom>
+            <a:noFill/>
+            <a:ln w="9525">
+              <a:solidFill>
+                <a:schemeClr val="tx1"/>
+              </a:solidFill>
+              <a:headEnd type="none" w="med" len="med"/>
+              <a:tailEnd type="triangle" w="med" len="med"/>
+            </a:ln>
+          </p:spPr>
+          <p:style>
+            <a:lnRef idx="2">
+              <a:schemeClr val="accent1">
+                <a:shade val="50000"/>
+              </a:schemeClr>
+            </a:lnRef>
+            <a:fillRef idx="1">
+              <a:schemeClr val="accent1"/>
+            </a:fillRef>
+            <a:effectRef idx="0">
+              <a:schemeClr val="accent1"/>
+            </a:effectRef>
+            <a:fontRef idx="minor">
+              <a:schemeClr val="lt1"/>
+            </a:fontRef>
+          </p:style>
+          <p:txBody>
+            <a:bodyPr rtlCol="0" anchor="ctr"/>
+            <a:lstStyle/>
+            <a:p>
+              <a:pPr algn="ctr"/>
+              <a:r>
+                <a:rPr lang="en-GB" sz="1200" dirty="0">
+                  <a:solidFill>
+                    <a:schemeClr val="tx1"/>
+                  </a:solidFill>
+                </a:rPr>
+                <a:t>Extreme events in the historical record</a:t>
+              </a:r>
+            </a:p>
+          </p:txBody>
+        </p:sp>
+        <p:cxnSp>
+          <p:nvCxnSpPr>
+            <p:cNvPr id="18" name="Straight Arrow Connector 17">
+              <a:extLst>
+                <a:ext uri="{FF2B5EF4-FFF2-40B4-BE49-F238E27FC236}">
+                  <a16:creationId xmlns:a16="http://schemas.microsoft.com/office/drawing/2014/main" id="{365941DF-882E-E2E6-7495-9380B9E87B49}"/>
+                </a:ext>
+              </a:extLst>
+            </p:cNvPr>
+            <p:cNvCxnSpPr>
+              <a:cxnSpLocks/>
+              <a:stCxn id="16" idx="0"/>
+            </p:cNvCxnSpPr>
+            <p:nvPr/>
+          </p:nvCxnSpPr>
+          <p:spPr>
+            <a:xfrm>
+              <a:off x="2979492" y="2663038"/>
+              <a:ext cx="778776" cy="1036507"/>
+            </a:xfrm>
+            <a:prstGeom prst="straightConnector1">
+              <a:avLst/>
+            </a:prstGeom>
+            <a:ln>
+              <a:solidFill>
+                <a:schemeClr val="tx1"/>
+              </a:solidFill>
+              <a:tailEnd type="triangle"/>
+            </a:ln>
+          </p:spPr>
+          <p:style>
+            <a:lnRef idx="1">
+              <a:schemeClr val="accent1"/>
+            </a:lnRef>
+            <a:fillRef idx="0">
+              <a:schemeClr val="accent1"/>
+            </a:fillRef>
+            <a:effectRef idx="0">
+              <a:schemeClr val="accent1"/>
+            </a:effectRef>
+            <a:fontRef idx="minor">
+              <a:schemeClr val="tx1"/>
+            </a:fontRef>
+          </p:style>
+        </p:cxnSp>
+        <p:cxnSp>
+          <p:nvCxnSpPr>
+            <p:cNvPr id="20" name="Straight Arrow Connector 19">
+              <a:extLst>
+                <a:ext uri="{FF2B5EF4-FFF2-40B4-BE49-F238E27FC236}">
+                  <a16:creationId xmlns:a16="http://schemas.microsoft.com/office/drawing/2014/main" id="{589130F1-058C-489C-05D8-74C898201DAC}"/>
+                </a:ext>
+              </a:extLst>
+            </p:cNvPr>
+            <p:cNvCxnSpPr>
+              <a:cxnSpLocks/>
+              <a:stCxn id="16" idx="0"/>
+            </p:cNvCxnSpPr>
+            <p:nvPr/>
+          </p:nvCxnSpPr>
+          <p:spPr>
+            <a:xfrm>
+              <a:off x="2979492" y="2663038"/>
+              <a:ext cx="1230445" cy="715628"/>
+            </a:xfrm>
+            <a:prstGeom prst="straightConnector1">
+              <a:avLst/>
+            </a:prstGeom>
+            <a:ln>
+              <a:solidFill>
+                <a:schemeClr val="tx1"/>
+              </a:solidFill>
+              <a:tailEnd type="triangle"/>
+            </a:ln>
+          </p:spPr>
+          <p:style>
+            <a:lnRef idx="1">
+              <a:schemeClr val="accent1"/>
+            </a:lnRef>
+            <a:fillRef idx="0">
+              <a:schemeClr val="accent1"/>
+            </a:fillRef>
+            <a:effectRef idx="0">
+              <a:schemeClr val="accent1"/>
+            </a:effectRef>
+            <a:fontRef idx="minor">
+              <a:schemeClr val="tx1"/>
+            </a:fontRef>
+          </p:style>
+        </p:cxnSp>
+        <p:sp>
+          <p:nvSpPr>
+            <p:cNvPr id="24" name="Callout: Line 23">
+              <a:extLst>
+                <a:ext uri="{FF2B5EF4-FFF2-40B4-BE49-F238E27FC236}">
+                  <a16:creationId xmlns:a16="http://schemas.microsoft.com/office/drawing/2014/main" id="{8C544255-6E1A-C89C-2B35-02F36D3656ED}"/>
+                </a:ext>
+              </a:extLst>
+            </p:cNvPr>
+            <p:cNvSpPr/>
+            <p:nvPr/>
+          </p:nvSpPr>
+          <p:spPr>
+            <a:xfrm>
+              <a:off x="5675625" y="5408574"/>
+              <a:ext cx="2130803" cy="648050"/>
+            </a:xfrm>
+            <a:prstGeom prst="borderCallout1">
+              <a:avLst>
+                <a:gd name="adj1" fmla="val -1963"/>
+                <a:gd name="adj2" fmla="val 50297"/>
+                <a:gd name="adj3" fmla="val -62258"/>
+                <a:gd name="adj4" fmla="val 40013"/>
+              </a:avLst>
+            </a:prstGeom>
+            <a:noFill/>
+            <a:ln>
+              <a:solidFill>
+                <a:schemeClr val="bg1">
+                  <a:lumMod val="65000"/>
+                </a:schemeClr>
+              </a:solidFill>
+              <a:headEnd type="none" w="med" len="med"/>
+              <a:tailEnd type="triangle" w="med" len="med"/>
+            </a:ln>
+          </p:spPr>
+          <p:style>
+            <a:lnRef idx="2">
+              <a:schemeClr val="accent1">
+                <a:shade val="50000"/>
+              </a:schemeClr>
+            </a:lnRef>
+            <a:fillRef idx="1">
+              <a:schemeClr val="accent1"/>
+            </a:fillRef>
+            <a:effectRef idx="0">
+              <a:schemeClr val="accent1"/>
+            </a:effectRef>
+            <a:fontRef idx="minor">
+              <a:schemeClr val="lt1"/>
+            </a:fontRef>
+          </p:style>
+          <p:txBody>
+            <a:bodyPr rtlCol="0" anchor="ctr"/>
+            <a:lstStyle/>
+            <a:p>
+              <a:pPr algn="ctr"/>
+              <a:r>
+                <a:rPr lang="en-GB" sz="1600" dirty="0">
+                  <a:solidFill>
+                    <a:schemeClr val="bg1">
+                      <a:lumMod val="65000"/>
+                    </a:schemeClr>
+                  </a:solidFill>
+                </a:rPr>
+                <a:t>“old” S2S forecasts from previous 4 weeks</a:t>
+              </a:r>
+            </a:p>
+          </p:txBody>
+        </p:sp>
+        <p:grpSp>
+          <p:nvGrpSpPr>
+            <p:cNvPr id="41" name="Group 40">
+              <a:extLst>
+                <a:ext uri="{FF2B5EF4-FFF2-40B4-BE49-F238E27FC236}">
+                  <a16:creationId xmlns:a16="http://schemas.microsoft.com/office/drawing/2014/main" id="{9436DD00-4E4F-4182-5B5D-FBB3B9A85E34}"/>
+                </a:ext>
+              </a:extLst>
+            </p:cNvPr>
+            <p:cNvGrpSpPr/>
+            <p:nvPr/>
+          </p:nvGrpSpPr>
+          <p:grpSpPr>
+            <a:xfrm>
+              <a:off x="10474539" y="2192667"/>
+              <a:ext cx="1364651" cy="2833309"/>
+              <a:chOff x="10474539" y="2192667"/>
+              <a:chExt cx="1364651" cy="2833309"/>
+            </a:xfrm>
+          </p:grpSpPr>
+          <p:sp>
+            <p:nvSpPr>
+              <p:cNvPr id="29" name="Rectangle 28">
+                <a:extLst>
+                  <a:ext uri="{FF2B5EF4-FFF2-40B4-BE49-F238E27FC236}">
+                    <a16:creationId xmlns:a16="http://schemas.microsoft.com/office/drawing/2014/main" id="{96C3EA16-F81F-6730-80CD-31402A6217E9}"/>
+                  </a:ext>
+                </a:extLst>
+              </p:cNvPr>
+              <p:cNvSpPr/>
+              <p:nvPr/>
+            </p:nvSpPr>
+            <p:spPr>
+              <a:xfrm>
+                <a:off x="10474539" y="2339013"/>
+                <a:ext cx="222018" cy="648050"/>
+              </a:xfrm>
+              <a:prstGeom prst="rect">
+                <a:avLst/>
+              </a:prstGeom>
+              <a:solidFill>
+                <a:srgbClr val="8856A7"/>
+              </a:solidFill>
+            </p:spPr>
+            <p:style>
+              <a:lnRef idx="2">
+                <a:schemeClr val="accent1">
+                  <a:shade val="50000"/>
+                </a:schemeClr>
+              </a:lnRef>
+              <a:fillRef idx="1">
+                <a:schemeClr val="accent1"/>
+              </a:fillRef>
+              <a:effectRef idx="0">
+                <a:schemeClr val="accent1"/>
+              </a:effectRef>
+              <a:fontRef idx="minor">
+                <a:schemeClr val="lt1"/>
+              </a:fontRef>
+            </p:style>
+            <p:txBody>
+              <a:bodyPr rtlCol="0" anchor="ctr"/>
+              <a:lstStyle/>
+              <a:p>
+                <a:pPr algn="ctr"/>
+                <a:endParaRPr lang="en-GB"/>
+              </a:p>
+            </p:txBody>
+          </p:sp>
+          <p:sp>
+            <p:nvSpPr>
+              <p:cNvPr id="30" name="Rectangle 29">
+                <a:extLst>
+                  <a:ext uri="{FF2B5EF4-FFF2-40B4-BE49-F238E27FC236}">
+                    <a16:creationId xmlns:a16="http://schemas.microsoft.com/office/drawing/2014/main" id="{591FFB21-FFD7-26F0-9898-40BB773186F9}"/>
+                  </a:ext>
+                </a:extLst>
+              </p:cNvPr>
+              <p:cNvSpPr/>
+              <p:nvPr/>
+            </p:nvSpPr>
+            <p:spPr>
+              <a:xfrm>
+                <a:off x="10474539" y="2987063"/>
+                <a:ext cx="222018" cy="648050"/>
+              </a:xfrm>
+              <a:prstGeom prst="rect">
+                <a:avLst/>
+              </a:prstGeom>
+              <a:solidFill>
+                <a:srgbClr val="9EBCDA"/>
+              </a:solidFill>
+            </p:spPr>
+            <p:style>
+              <a:lnRef idx="2">
+                <a:schemeClr val="accent1">
+                  <a:shade val="50000"/>
+                </a:schemeClr>
+              </a:lnRef>
+              <a:fillRef idx="1">
+                <a:schemeClr val="accent1"/>
+              </a:fillRef>
+              <a:effectRef idx="0">
+                <a:schemeClr val="accent1"/>
+              </a:effectRef>
+              <a:fontRef idx="minor">
+                <a:schemeClr val="lt1"/>
+              </a:fontRef>
+            </p:style>
+            <p:txBody>
+              <a:bodyPr rtlCol="0" anchor="ctr"/>
+              <a:lstStyle/>
+              <a:p>
+                <a:pPr algn="ctr"/>
+                <a:endParaRPr lang="en-GB"/>
+              </a:p>
+            </p:txBody>
+          </p:sp>
+          <p:sp>
+            <p:nvSpPr>
+              <p:cNvPr id="31" name="Rectangle 30">
+                <a:extLst>
+                  <a:ext uri="{FF2B5EF4-FFF2-40B4-BE49-F238E27FC236}">
+                    <a16:creationId xmlns:a16="http://schemas.microsoft.com/office/drawing/2014/main" id="{1D9D7E65-841D-7C89-CB84-C0C77C263FC6}"/>
+                  </a:ext>
+                </a:extLst>
+              </p:cNvPr>
+              <p:cNvSpPr/>
+              <p:nvPr/>
+            </p:nvSpPr>
+            <p:spPr>
+              <a:xfrm>
+                <a:off x="10474539" y="3635113"/>
+                <a:ext cx="222018" cy="648050"/>
+              </a:xfrm>
+              <a:prstGeom prst="rect">
+                <a:avLst/>
+              </a:prstGeom>
+              <a:solidFill>
+                <a:srgbClr val="9EBCDA"/>
+              </a:solidFill>
+            </p:spPr>
+            <p:style>
+              <a:lnRef idx="2">
+                <a:schemeClr val="accent1">
+                  <a:shade val="50000"/>
+                </a:schemeClr>
+              </a:lnRef>
+              <a:fillRef idx="1">
+                <a:schemeClr val="accent1"/>
+              </a:fillRef>
+              <a:effectRef idx="0">
+                <a:schemeClr val="accent1"/>
+              </a:effectRef>
+              <a:fontRef idx="minor">
+                <a:schemeClr val="lt1"/>
+              </a:fontRef>
+            </p:style>
+            <p:txBody>
+              <a:bodyPr rtlCol="0" anchor="ctr"/>
+              <a:lstStyle/>
+              <a:p>
+                <a:pPr algn="ctr"/>
+                <a:endParaRPr lang="en-GB"/>
+              </a:p>
+            </p:txBody>
+          </p:sp>
+          <p:sp>
+            <p:nvSpPr>
+              <p:cNvPr id="32" name="Rectangle 31">
+                <a:extLst>
+                  <a:ext uri="{FF2B5EF4-FFF2-40B4-BE49-F238E27FC236}">
+                    <a16:creationId xmlns:a16="http://schemas.microsoft.com/office/drawing/2014/main" id="{1FB9328E-8886-2327-5D97-1964A6804076}"/>
+                  </a:ext>
+                </a:extLst>
+              </p:cNvPr>
+              <p:cNvSpPr/>
+              <p:nvPr/>
+            </p:nvSpPr>
+            <p:spPr>
+              <a:xfrm>
+                <a:off x="10474539" y="4283163"/>
+                <a:ext cx="222018" cy="648050"/>
+              </a:xfrm>
+              <a:prstGeom prst="rect">
+                <a:avLst/>
+              </a:prstGeom>
+              <a:solidFill>
+                <a:srgbClr val="E0ECF4"/>
+              </a:solidFill>
+            </p:spPr>
+            <p:style>
+              <a:lnRef idx="2">
+                <a:schemeClr val="accent1">
+                  <a:shade val="50000"/>
+                </a:schemeClr>
+              </a:lnRef>
+              <a:fillRef idx="1">
+                <a:schemeClr val="accent1"/>
+              </a:fillRef>
+              <a:effectRef idx="0">
+                <a:schemeClr val="accent1"/>
+              </a:effectRef>
+              <a:fontRef idx="minor">
+                <a:schemeClr val="lt1"/>
+              </a:fontRef>
+            </p:style>
+            <p:txBody>
+              <a:bodyPr rtlCol="0" anchor="ctr"/>
+              <a:lstStyle/>
+              <a:p>
+                <a:pPr algn="ctr"/>
+                <a:endParaRPr lang="en-GB"/>
+              </a:p>
+            </p:txBody>
+          </p:sp>
+          <p:cxnSp>
+            <p:nvCxnSpPr>
+              <p:cNvPr id="34" name="Straight Connector 33">
+                <a:extLst>
+                  <a:ext uri="{FF2B5EF4-FFF2-40B4-BE49-F238E27FC236}">
+                    <a16:creationId xmlns:a16="http://schemas.microsoft.com/office/drawing/2014/main" id="{E36B9C9B-F117-EF5A-4A65-B89D3BBD3E2A}"/>
+                  </a:ext>
+                </a:extLst>
+              </p:cNvPr>
+              <p:cNvCxnSpPr>
+                <a:cxnSpLocks/>
+              </p:cNvCxnSpPr>
+              <p:nvPr/>
+            </p:nvCxnSpPr>
+            <p:spPr>
+              <a:xfrm>
+                <a:off x="10474539" y="3635113"/>
+                <a:ext cx="222018" cy="0"/>
+              </a:xfrm>
+              <a:prstGeom prst="line">
+                <a:avLst/>
+              </a:prstGeom>
+              <a:ln w="38100">
+                <a:solidFill>
+                  <a:schemeClr val="tx1"/>
+                </a:solidFill>
+              </a:ln>
+            </p:spPr>
+            <p:style>
+              <a:lnRef idx="1">
+                <a:schemeClr val="accent1"/>
+              </a:lnRef>
+              <a:fillRef idx="0">
+                <a:schemeClr val="accent1"/>
+              </a:fillRef>
+              <a:effectRef idx="0">
+                <a:schemeClr val="accent1"/>
+              </a:effectRef>
+              <a:fontRef idx="minor">
+                <a:schemeClr val="tx1"/>
+              </a:fontRef>
+            </p:style>
+          </p:cxnSp>
+          <p:sp>
+            <p:nvSpPr>
+              <p:cNvPr id="36" name="TextBox 35">
+                <a:extLst>
+                  <a:ext uri="{FF2B5EF4-FFF2-40B4-BE49-F238E27FC236}">
+                    <a16:creationId xmlns:a16="http://schemas.microsoft.com/office/drawing/2014/main" id="{0306FEAF-E0D0-AA8E-0C59-C8FA7DC259B6}"/>
+                  </a:ext>
+                </a:extLst>
+              </p:cNvPr>
+              <p:cNvSpPr txBox="1"/>
+              <p:nvPr/>
+            </p:nvSpPr>
+            <p:spPr>
+              <a:xfrm>
+                <a:off x="10688168" y="3488768"/>
+                <a:ext cx="1151022" cy="276999"/>
+              </a:xfrm>
+              <a:prstGeom prst="rect">
+                <a:avLst/>
+              </a:prstGeom>
+              <a:noFill/>
+            </p:spPr>
+            <p:txBody>
+              <a:bodyPr wrap="square" rtlCol="0">
+                <a:spAutoFit/>
+              </a:bodyPr>
+              <a:lstStyle/>
+              <a:p>
+                <a:r>
+                  <a:rPr lang="en-GB" sz="1200" dirty="0"/>
+                  <a:t>Median[50%]</a:t>
+                </a:r>
+              </a:p>
+            </p:txBody>
+          </p:sp>
+          <p:sp>
+            <p:nvSpPr>
+              <p:cNvPr id="37" name="TextBox 36">
+                <a:extLst>
+                  <a:ext uri="{FF2B5EF4-FFF2-40B4-BE49-F238E27FC236}">
+                    <a16:creationId xmlns:a16="http://schemas.microsoft.com/office/drawing/2014/main" id="{AA8777B9-2A6E-EB81-F924-EA89421EA917}"/>
+                  </a:ext>
+                </a:extLst>
+              </p:cNvPr>
+              <p:cNvSpPr txBox="1"/>
+              <p:nvPr/>
+            </p:nvSpPr>
+            <p:spPr>
+              <a:xfrm>
+                <a:off x="10679362" y="4136817"/>
+                <a:ext cx="1151022" cy="276999"/>
+              </a:xfrm>
+              <a:prstGeom prst="rect">
+                <a:avLst/>
+              </a:prstGeom>
+              <a:noFill/>
+            </p:spPr>
+            <p:txBody>
+              <a:bodyPr wrap="square" rtlCol="0">
+                <a:spAutoFit/>
+              </a:bodyPr>
+              <a:lstStyle/>
+              <a:p>
+                <a:r>
+                  <a:rPr lang="en-GB" sz="1200" dirty="0"/>
+                  <a:t>Lower [25%]</a:t>
+                </a:r>
+              </a:p>
+            </p:txBody>
+          </p:sp>
+          <p:sp>
+            <p:nvSpPr>
+              <p:cNvPr id="38" name="TextBox 37">
+                <a:extLst>
+                  <a:ext uri="{FF2B5EF4-FFF2-40B4-BE49-F238E27FC236}">
+                    <a16:creationId xmlns:a16="http://schemas.microsoft.com/office/drawing/2014/main" id="{F73E7C9A-B47C-F80A-6CD3-24A6A32F8C98}"/>
+                  </a:ext>
+                </a:extLst>
+              </p:cNvPr>
+              <p:cNvSpPr txBox="1"/>
+              <p:nvPr/>
+            </p:nvSpPr>
+            <p:spPr>
+              <a:xfrm>
+                <a:off x="10679362" y="2840717"/>
+                <a:ext cx="1151022" cy="276999"/>
+              </a:xfrm>
+              <a:prstGeom prst="rect">
+                <a:avLst/>
+              </a:prstGeom>
+              <a:noFill/>
+            </p:spPr>
+            <p:txBody>
+              <a:bodyPr wrap="square" rtlCol="0">
+                <a:spAutoFit/>
+              </a:bodyPr>
+              <a:lstStyle/>
+              <a:p>
+                <a:r>
+                  <a:rPr lang="en-GB" sz="1200" dirty="0"/>
+                  <a:t>Upper [25%]</a:t>
+                </a:r>
+              </a:p>
+            </p:txBody>
+          </p:sp>
+          <p:sp>
+            <p:nvSpPr>
+              <p:cNvPr id="39" name="TextBox 38">
+                <a:extLst>
+                  <a:ext uri="{FF2B5EF4-FFF2-40B4-BE49-F238E27FC236}">
+                    <a16:creationId xmlns:a16="http://schemas.microsoft.com/office/drawing/2014/main" id="{8AA7A458-B3AE-B570-0EED-AE7C0BA13547}"/>
+                  </a:ext>
+                </a:extLst>
+              </p:cNvPr>
+              <p:cNvSpPr txBox="1"/>
+              <p:nvPr/>
+            </p:nvSpPr>
+            <p:spPr>
+              <a:xfrm>
+                <a:off x="10679362" y="2192667"/>
+                <a:ext cx="1151022" cy="276999"/>
+              </a:xfrm>
+              <a:prstGeom prst="rect">
+                <a:avLst/>
+              </a:prstGeom>
+              <a:noFill/>
+            </p:spPr>
+            <p:txBody>
+              <a:bodyPr wrap="square" rtlCol="0">
+                <a:spAutoFit/>
+              </a:bodyPr>
+              <a:lstStyle/>
+              <a:p>
+                <a:r>
+                  <a:rPr lang="en-GB" sz="1200" dirty="0"/>
+                  <a:t>Max</a:t>
+                </a:r>
+              </a:p>
+            </p:txBody>
+          </p:sp>
+          <p:sp>
+            <p:nvSpPr>
+              <p:cNvPr id="40" name="TextBox 39">
+                <a:extLst>
+                  <a:ext uri="{FF2B5EF4-FFF2-40B4-BE49-F238E27FC236}">
+                    <a16:creationId xmlns:a16="http://schemas.microsoft.com/office/drawing/2014/main" id="{AA805383-9660-BD4F-B550-5979EE4705C1}"/>
+                  </a:ext>
+                </a:extLst>
+              </p:cNvPr>
+              <p:cNvSpPr txBox="1"/>
+              <p:nvPr/>
+            </p:nvSpPr>
+            <p:spPr>
+              <a:xfrm>
+                <a:off x="10679362" y="4748977"/>
+                <a:ext cx="1151022" cy="276999"/>
+              </a:xfrm>
+              <a:prstGeom prst="rect">
+                <a:avLst/>
+              </a:prstGeom>
+              <a:noFill/>
+            </p:spPr>
+            <p:txBody>
+              <a:bodyPr wrap="square" rtlCol="0">
+                <a:spAutoFit/>
+              </a:bodyPr>
+              <a:lstStyle/>
+              <a:p>
+                <a:r>
+                  <a:rPr lang="en-GB" sz="1200" dirty="0"/>
+                  <a:t>Min</a:t>
+                </a:r>
+              </a:p>
+            </p:txBody>
+          </p:sp>
+        </p:grpSp>
+        <p:sp>
+          <p:nvSpPr>
+            <p:cNvPr id="42" name="TextBox 41">
+              <a:extLst>
+                <a:ext uri="{FF2B5EF4-FFF2-40B4-BE49-F238E27FC236}">
+                  <a16:creationId xmlns:a16="http://schemas.microsoft.com/office/drawing/2014/main" id="{C6133532-1FBD-5807-9D9B-4DBE53DEB2B7}"/>
+                </a:ext>
+              </a:extLst>
+            </p:cNvPr>
+            <p:cNvSpPr txBox="1"/>
+            <p:nvPr/>
+          </p:nvSpPr>
+          <p:spPr>
+            <a:xfrm>
+              <a:off x="10357093" y="1837189"/>
+              <a:ext cx="1563663" cy="369332"/>
+            </a:xfrm>
+            <a:prstGeom prst="rect">
+              <a:avLst/>
+            </a:prstGeom>
+            <a:noFill/>
+          </p:spPr>
+          <p:txBody>
+            <a:bodyPr wrap="square" rtlCol="0">
+              <a:spAutoFit/>
+            </a:bodyPr>
+            <a:lstStyle/>
+            <a:p>
+              <a:r>
+                <a:rPr lang="en-GB" dirty="0"/>
+                <a:t>Climatology</a:t>
               </a:r>
             </a:p>
           </p:txBody>
         </p:sp>
       </p:grpSp>
-      <p:sp>
-        <p:nvSpPr>
-          <p:cNvPr id="2" name="TextBox 1">
-            <a:extLst>
-              <a:ext uri="{FF2B5EF4-FFF2-40B4-BE49-F238E27FC236}">
-                <a16:creationId xmlns:a16="http://schemas.microsoft.com/office/drawing/2014/main" id="{DD479588-5E62-EF56-7DAE-91D8F700BFC1}"/>
-              </a:ext>
-            </a:extLst>
-          </p:cNvPr>
-          <p:cNvSpPr txBox="1"/>
-          <p:nvPr/>
-        </p:nvSpPr>
-        <p:spPr>
-          <a:xfrm>
-            <a:off x="3014039" y="5484740"/>
-            <a:ext cx="494950" cy="369332"/>
-          </a:xfrm>
-          <a:prstGeom prst="rect">
-            <a:avLst/>
-          </a:prstGeom>
-          <a:noFill/>
-        </p:spPr>
-        <p:txBody>
-          <a:bodyPr wrap="square" rtlCol="0">
-            <a:spAutoFit/>
-          </a:bodyPr>
-          <a:lstStyle/>
-          <a:p>
-            <a:r>
-              <a:rPr lang="en-GB" dirty="0"/>
-              <a:t>10</a:t>
-            </a:r>
-          </a:p>
-        </p:txBody>
-      </p:sp>
-      <p:sp>
-        <p:nvSpPr>
-          <p:cNvPr id="3" name="TextBox 2">
-            <a:extLst>
-              <a:ext uri="{FF2B5EF4-FFF2-40B4-BE49-F238E27FC236}">
-                <a16:creationId xmlns:a16="http://schemas.microsoft.com/office/drawing/2014/main" id="{1A62328C-23BF-D754-102E-250012E081CD}"/>
-              </a:ext>
-            </a:extLst>
-          </p:cNvPr>
-          <p:cNvSpPr txBox="1"/>
-          <p:nvPr/>
-        </p:nvSpPr>
-        <p:spPr>
-          <a:xfrm>
-            <a:off x="4986850" y="5483809"/>
-            <a:ext cx="494950" cy="369332"/>
-          </a:xfrm>
-          <a:prstGeom prst="rect">
-            <a:avLst/>
-          </a:prstGeom>
-          <a:noFill/>
-        </p:spPr>
-        <p:txBody>
-          <a:bodyPr wrap="square" rtlCol="0">
-            <a:spAutoFit/>
-          </a:bodyPr>
-          <a:lstStyle/>
-          <a:p>
-            <a:r>
-              <a:rPr lang="en-GB" dirty="0"/>
-              <a:t>20</a:t>
-            </a:r>
-          </a:p>
-        </p:txBody>
-      </p:sp>
-      <p:sp>
-        <p:nvSpPr>
-          <p:cNvPr id="4" name="TextBox 3">
-            <a:extLst>
-              <a:ext uri="{FF2B5EF4-FFF2-40B4-BE49-F238E27FC236}">
-                <a16:creationId xmlns:a16="http://schemas.microsoft.com/office/drawing/2014/main" id="{0100443F-3887-CE12-24CE-344C826AB266}"/>
-              </a:ext>
-            </a:extLst>
-          </p:cNvPr>
-          <p:cNvSpPr txBox="1"/>
-          <p:nvPr/>
-        </p:nvSpPr>
-        <p:spPr>
-          <a:xfrm>
-            <a:off x="6838141" y="5483809"/>
-            <a:ext cx="494950" cy="369332"/>
-          </a:xfrm>
-          <a:prstGeom prst="rect">
-            <a:avLst/>
-          </a:prstGeom>
-          <a:noFill/>
-        </p:spPr>
-        <p:txBody>
-          <a:bodyPr wrap="square" rtlCol="0">
-            <a:spAutoFit/>
-          </a:bodyPr>
-          <a:lstStyle/>
-          <a:p>
-            <a:r>
-              <a:rPr lang="en-GB" dirty="0"/>
-              <a:t>30</a:t>
-            </a:r>
-          </a:p>
-        </p:txBody>
-      </p:sp>
-      <p:sp>
-        <p:nvSpPr>
-          <p:cNvPr id="6" name="TextBox 5">
-            <a:extLst>
-              <a:ext uri="{FF2B5EF4-FFF2-40B4-BE49-F238E27FC236}">
-                <a16:creationId xmlns:a16="http://schemas.microsoft.com/office/drawing/2014/main" id="{3CE9C810-17C9-2B34-8EA9-06896DC79794}"/>
-              </a:ext>
-            </a:extLst>
-          </p:cNvPr>
-          <p:cNvSpPr txBox="1"/>
-          <p:nvPr/>
-        </p:nvSpPr>
-        <p:spPr>
-          <a:xfrm>
-            <a:off x="8683011" y="5483809"/>
-            <a:ext cx="494950" cy="369332"/>
-          </a:xfrm>
-          <a:prstGeom prst="rect">
-            <a:avLst/>
-          </a:prstGeom>
-          <a:noFill/>
-        </p:spPr>
-        <p:txBody>
-          <a:bodyPr wrap="square" rtlCol="0">
-            <a:spAutoFit/>
-          </a:bodyPr>
-          <a:lstStyle/>
-          <a:p>
-            <a:r>
-              <a:rPr lang="en-GB" dirty="0"/>
-              <a:t>40</a:t>
-            </a:r>
-          </a:p>
-        </p:txBody>
-      </p:sp>
-      <p:sp>
-        <p:nvSpPr>
-          <p:cNvPr id="7" name="TextBox 6">
-            <a:extLst>
-              <a:ext uri="{FF2B5EF4-FFF2-40B4-BE49-F238E27FC236}">
-                <a16:creationId xmlns:a16="http://schemas.microsoft.com/office/drawing/2014/main" id="{AE5624F2-BC40-AFC6-0FAE-14FEFC6202B6}"/>
-              </a:ext>
-            </a:extLst>
-          </p:cNvPr>
-          <p:cNvSpPr txBox="1"/>
-          <p:nvPr/>
-        </p:nvSpPr>
-        <p:spPr>
-          <a:xfrm>
-            <a:off x="10615863" y="5483809"/>
-            <a:ext cx="494950" cy="369332"/>
-          </a:xfrm>
-          <a:prstGeom prst="rect">
-            <a:avLst/>
-          </a:prstGeom>
-          <a:noFill/>
-        </p:spPr>
-        <p:txBody>
-          <a:bodyPr wrap="square" rtlCol="0">
-            <a:spAutoFit/>
-          </a:bodyPr>
-          <a:lstStyle/>
-          <a:p>
-            <a:r>
-              <a:rPr lang="en-GB" dirty="0"/>
-              <a:t>50</a:t>
-            </a:r>
-          </a:p>
-        </p:txBody>
-      </p:sp>
-      <p:sp>
-        <p:nvSpPr>
-          <p:cNvPr id="16" name="TextBox 15">
-            <a:extLst>
-              <a:ext uri="{FF2B5EF4-FFF2-40B4-BE49-F238E27FC236}">
-                <a16:creationId xmlns:a16="http://schemas.microsoft.com/office/drawing/2014/main" id="{B98A2C33-0C14-49CC-F40A-C60A46078EF5}"/>
-              </a:ext>
-            </a:extLst>
-          </p:cNvPr>
-          <p:cNvSpPr txBox="1"/>
-          <p:nvPr/>
-        </p:nvSpPr>
-        <p:spPr>
-          <a:xfrm>
-            <a:off x="5081427" y="5807379"/>
-            <a:ext cx="2626160" cy="369332"/>
-          </a:xfrm>
-          <a:prstGeom prst="rect">
-            <a:avLst/>
-          </a:prstGeom>
-          <a:noFill/>
-        </p:spPr>
-        <p:txBody>
-          <a:bodyPr wrap="square" rtlCol="0">
-            <a:spAutoFit/>
-          </a:bodyPr>
-          <a:lstStyle/>
-          <a:p>
-            <a:pPr algn="ctr"/>
-            <a:r>
-              <a:rPr lang="en-GB" dirty="0"/>
-              <a:t>Week in the year</a:t>
-            </a:r>
-          </a:p>
-        </p:txBody>
-      </p:sp>
     </p:spTree>
     <p:extLst>
       <p:ext uri="{BB962C8B-B14F-4D97-AF65-F5344CB8AC3E}">
-        <p14:creationId xmlns:p14="http://schemas.microsoft.com/office/powerpoint/2010/main" val="4241947628"/>
+        <p14:creationId xmlns:p14="http://schemas.microsoft.com/office/powerpoint/2010/main" val="3663012230"/>
       </p:ext>
     </p:extLst>
   </p:cSld>

</xml_diff>